<commit_message>
modified:   ITA-collect-compare_classroom_lecture_ja.pdf 	modified:   ITA-collect-compare_classroom_lecture_ja.pptx 	modified:   ITA-collect-compare_practice_ja.pdf 	modified:   ITA-collect-compare_practice_ja.pptx
</commit_message>
<xml_diff>
--- a/asset/Learn_ja/ITA-collect-compare_classroom_lecture_ja.pptx
+++ b/asset/Learn_ja/ITA-collect-compare_classroom_lecture_ja.pptx
@@ -326,7 +326,7 @@
               <a:rPr kumimoji="1" lang="ja-JP" altLang="en-US" smtClean="0">
                 <a:ea typeface="メイリオ" panose="020B0604030504040204" pitchFamily="50" charset="-128"/>
               </a:rPr>
-              <a:t>2021/8/4</a:t>
+              <a:t>2022/1/7</a:t>
             </a:fld>
             <a:endParaRPr kumimoji="1" lang="ja-JP" altLang="en-US" dirty="0">
               <a:ea typeface="メイリオ" panose="020B0604030504040204" pitchFamily="50" charset="-128"/>
@@ -472,7 +472,7 @@
             <a:fld id="{4B26993D-C081-44EB-B0F5-A9F467792B62}" type="datetimeFigureOut">
               <a:rPr lang="ja-JP" altLang="en-US" smtClean="0"/>
               <a:pPr/>
-              <a:t>2021/8/4</a:t>
+              <a:t>2022/1/7</a:t>
             </a:fld>
             <a:endParaRPr lang="ja-JP" altLang="en-US" dirty="0"/>
           </a:p>
@@ -1095,7 +1095,7 @@
           <a:p>
             <a:fld id="{56F9016B-CCA6-43BE-8BEE-59565A35F4F7}" type="datetimeFigureOut">
               <a:rPr kumimoji="1" lang="ja-JP" altLang="en-US" smtClean="0"/>
-              <a:t>2021/8/4</a:t>
+              <a:t>2022/1/7</a:t>
             </a:fld>
             <a:endParaRPr kumimoji="1" lang="ja-JP" altLang="en-US"/>
           </a:p>
@@ -1297,7 +1297,7 @@
           <a:p>
             <a:fld id="{56F9016B-CCA6-43BE-8BEE-59565A35F4F7}" type="datetimeFigureOut">
               <a:rPr kumimoji="1" lang="ja-JP" altLang="en-US" smtClean="0"/>
-              <a:t>2021/8/4</a:t>
+              <a:t>2022/1/7</a:t>
             </a:fld>
             <a:endParaRPr kumimoji="1" lang="ja-JP" altLang="en-US"/>
           </a:p>
@@ -1543,7 +1543,7 @@
           <a:p>
             <a:fld id="{56F9016B-CCA6-43BE-8BEE-59565A35F4F7}" type="datetimeFigureOut">
               <a:rPr kumimoji="1" lang="ja-JP" altLang="en-US" smtClean="0"/>
-              <a:t>2021/8/4</a:t>
+              <a:t>2022/1/7</a:t>
             </a:fld>
             <a:endParaRPr kumimoji="1" lang="ja-JP" altLang="en-US"/>
           </a:p>
@@ -1839,7 +1839,7 @@
           <a:p>
             <a:fld id="{56F9016B-CCA6-43BE-8BEE-59565A35F4F7}" type="datetimeFigureOut">
               <a:rPr kumimoji="1" lang="ja-JP" altLang="en-US" smtClean="0"/>
-              <a:t>2021/8/4</a:t>
+              <a:t>2022/1/7</a:t>
             </a:fld>
             <a:endParaRPr kumimoji="1" lang="ja-JP" altLang="en-US"/>
           </a:p>
@@ -2270,7 +2270,7 @@
           <a:p>
             <a:fld id="{56F9016B-CCA6-43BE-8BEE-59565A35F4F7}" type="datetimeFigureOut">
               <a:rPr kumimoji="1" lang="ja-JP" altLang="en-US" smtClean="0"/>
-              <a:t>2021/8/4</a:t>
+              <a:t>2022/1/7</a:t>
             </a:fld>
             <a:endParaRPr kumimoji="1" lang="ja-JP" altLang="en-US"/>
           </a:p>
@@ -2388,7 +2388,7 @@
           <a:p>
             <a:fld id="{56F9016B-CCA6-43BE-8BEE-59565A35F4F7}" type="datetimeFigureOut">
               <a:rPr kumimoji="1" lang="ja-JP" altLang="en-US" smtClean="0"/>
-              <a:t>2021/8/4</a:t>
+              <a:t>2022/1/7</a:t>
             </a:fld>
             <a:endParaRPr kumimoji="1" lang="ja-JP" altLang="en-US"/>
           </a:p>
@@ -2483,7 +2483,7 @@
           <a:p>
             <a:fld id="{56F9016B-CCA6-43BE-8BEE-59565A35F4F7}" type="datetimeFigureOut">
               <a:rPr kumimoji="1" lang="ja-JP" altLang="en-US" smtClean="0"/>
-              <a:t>2021/8/4</a:t>
+              <a:t>2022/1/7</a:t>
             </a:fld>
             <a:endParaRPr kumimoji="1" lang="ja-JP" altLang="en-US"/>
           </a:p>
@@ -2792,7 +2792,7 @@
           <a:p>
             <a:fld id="{56F9016B-CCA6-43BE-8BEE-59565A35F4F7}" type="datetimeFigureOut">
               <a:rPr kumimoji="1" lang="ja-JP" altLang="en-US" smtClean="0"/>
-              <a:t>2021/8/4</a:t>
+              <a:t>2022/1/7</a:t>
             </a:fld>
             <a:endParaRPr kumimoji="1" lang="ja-JP" altLang="en-US"/>
           </a:p>
@@ -3045,7 +3045,7 @@
           <a:p>
             <a:fld id="{56F9016B-CCA6-43BE-8BEE-59565A35F4F7}" type="datetimeFigureOut">
               <a:rPr kumimoji="1" lang="ja-JP" altLang="en-US" smtClean="0"/>
-              <a:t>2021/8/4</a:t>
+              <a:t>2022/1/7</a:t>
             </a:fld>
             <a:endParaRPr kumimoji="1" lang="ja-JP" altLang="en-US"/>
           </a:p>
@@ -3322,7 +3322,7 @@
           <a:p>
             <a:fld id="{56F9016B-CCA6-43BE-8BEE-59565A35F4F7}" type="datetimeFigureOut">
               <a:rPr kumimoji="1" lang="ja-JP" altLang="en-US" smtClean="0"/>
-              <a:t>2021/8/4</a:t>
+              <a:t>2022/1/7</a:t>
             </a:fld>
             <a:endParaRPr kumimoji="1" lang="ja-JP" altLang="en-US"/>
           </a:p>
@@ -3534,7 +3534,7 @@
           <a:p>
             <a:fld id="{56F9016B-CCA6-43BE-8BEE-59565A35F4F7}" type="datetimeFigureOut">
               <a:rPr kumimoji="1" lang="ja-JP" altLang="en-US" smtClean="0"/>
-              <a:t>2021/8/4</a:t>
+              <a:t>2022/1/7</a:t>
             </a:fld>
             <a:endParaRPr kumimoji="1" lang="ja-JP" altLang="en-US"/>
           </a:p>
@@ -6593,7 +6593,7 @@
           <a:p>
             <a:fld id="{56F9016B-CCA6-43BE-8BEE-59565A35F4F7}" type="datetimeFigureOut">
               <a:rPr kumimoji="1" lang="ja-JP" altLang="en-US" smtClean="0"/>
-              <a:t>2021/8/4</a:t>
+              <a:t>2022/1/7</a:t>
             </a:fld>
             <a:endParaRPr kumimoji="1" lang="ja-JP" altLang="en-US"/>
           </a:p>
@@ -7027,13 +7027,8 @@
           <a:p>
             <a:r>
               <a:rPr lang="en-US" altLang="ja-JP" dirty="0" smtClean="0"/>
-              <a:t>Exastro IT Automation Version </a:t>
-            </a:r>
-            <a:r>
-              <a:rPr lang="en-US" altLang="ja-JP" dirty="0" smtClean="0"/>
-              <a:t>1.8.0</a:t>
-            </a:r>
-            <a:endParaRPr lang="en-US" altLang="ja-JP" dirty="0" smtClean="0"/>
+              <a:t>Exastro IT Automation Version 1.9</a:t>
+            </a:r>
           </a:p>
           <a:p>
             <a:r>
@@ -9511,14 +9506,14 @@
           <p:nvPr>
             <p:extLst>
               <p:ext uri="{D42A27DB-BD31-4B8C-83A1-F6EECF244321}">
-                <p14:modId xmlns:p14="http://schemas.microsoft.com/office/powerpoint/2010/main" val="1034599269"/>
+                <p14:modId xmlns:p14="http://schemas.microsoft.com/office/powerpoint/2010/main" val="1034043614"/>
               </p:ext>
             </p:extLst>
           </p:nvPr>
         </p:nvGraphicFramePr>
         <p:xfrm>
           <a:off x="2708383" y="4327708"/>
-          <a:ext cx="6184216" cy="1737360"/>
+          <a:ext cx="6184216" cy="1706880"/>
         </p:xfrm>
         <a:graphic>
           <a:graphicData uri="http://schemas.openxmlformats.org/drawingml/2006/table">
@@ -9628,14 +9623,14 @@
                     <a:lstStyle/>
                     <a:p>
                       <a:r>
-                        <a:rPr kumimoji="1" lang="ja-JP" altLang="en-US" sz="1600" dirty="0" smtClean="0">
+                        <a:rPr kumimoji="1" lang="ja-JP" altLang="en-US" sz="1400" dirty="0" smtClean="0">
                           <a:solidFill>
                             <a:srgbClr val="FF0000"/>
                           </a:solidFill>
                         </a:rPr>
                         <a:t>収集済み</a:t>
                       </a:r>
-                      <a:endParaRPr kumimoji="1" lang="ja-JP" altLang="en-US" sz="1600" dirty="0">
+                      <a:endParaRPr kumimoji="1" lang="ja-JP" altLang="en-US" sz="1400" dirty="0">
                         <a:solidFill>
                           <a:srgbClr val="FF0000"/>
                         </a:solidFill>
@@ -9681,7 +9676,7 @@
                     <a:lstStyle/>
                     <a:p>
                       <a:r>
-                        <a:rPr kumimoji="1" lang="ja-JP" altLang="en-US" sz="1200" dirty="0" smtClean="0">
+                        <a:rPr kumimoji="1" lang="ja-JP" altLang="en-US" sz="1400" dirty="0" smtClean="0">
                           <a:solidFill>
                             <a:srgbClr val="FF0000"/>
                           </a:solidFill>
@@ -9736,14 +9731,14 @@
                     <a:lstStyle/>
                     <a:p>
                       <a:r>
-                        <a:rPr kumimoji="1" lang="ja-JP" altLang="en-US" sz="1600" dirty="0" smtClean="0">
+                        <a:rPr kumimoji="1" lang="ja-JP" altLang="en-US" sz="1400" dirty="0" smtClean="0">
                           <a:solidFill>
                             <a:srgbClr val="FF0000"/>
                           </a:solidFill>
                         </a:rPr>
                         <a:t>収集済み（通知あり）</a:t>
                       </a:r>
-                      <a:endParaRPr kumimoji="1" lang="ja-JP" altLang="en-US" sz="1600" dirty="0">
+                      <a:endParaRPr kumimoji="1" lang="ja-JP" altLang="en-US" sz="1400" dirty="0">
                         <a:solidFill>
                           <a:srgbClr val="FF0000"/>
                         </a:solidFill>
@@ -9798,7 +9793,7 @@
                     <a:lstStyle/>
                     <a:p>
                       <a:r>
-                        <a:rPr kumimoji="1" lang="ja-JP" altLang="en-US" sz="1200" dirty="0" smtClean="0">
+                        <a:rPr kumimoji="1" lang="ja-JP" altLang="en-US" sz="1400" dirty="0" smtClean="0">
                           <a:solidFill>
                             <a:srgbClr val="FF0000"/>
                           </a:solidFill>
@@ -9806,7 +9801,7 @@
                         <a:t>登録</a:t>
                       </a:r>
                       <a:r>
-                        <a:rPr kumimoji="1" lang="en-US" altLang="ja-JP" sz="1200" dirty="0" smtClean="0">
+                        <a:rPr kumimoji="1" lang="en-US" altLang="ja-JP" sz="1400" dirty="0" smtClean="0">
                           <a:solidFill>
                             <a:srgbClr val="FF0000"/>
                           </a:solidFill>
@@ -9814,14 +9809,14 @@
                         <a:t>/</a:t>
                       </a:r>
                       <a:r>
-                        <a:rPr kumimoji="1" lang="ja-JP" altLang="en-US" sz="1200" dirty="0" smtClean="0">
+                        <a:rPr kumimoji="1" lang="ja-JP" altLang="en-US" sz="1400" dirty="0" smtClean="0">
                           <a:solidFill>
                             <a:srgbClr val="FF0000"/>
                           </a:solidFill>
                         </a:rPr>
                         <a:t>更新中に不備があった場合</a:t>
                       </a:r>
-                      <a:endParaRPr kumimoji="1" lang="ja-JP" altLang="en-US" sz="1200" dirty="0">
+                      <a:endParaRPr kumimoji="1" lang="ja-JP" altLang="en-US" sz="1400" dirty="0">
                         <a:solidFill>
                           <a:srgbClr val="FF0000"/>
                         </a:solidFill>
@@ -9883,14 +9878,14 @@
                     <a:lstStyle/>
                     <a:p>
                       <a:r>
-                        <a:rPr kumimoji="1" lang="ja-JP" altLang="en-US" sz="1600" dirty="0" smtClean="0">
+                        <a:rPr kumimoji="1" lang="ja-JP" altLang="en-US" sz="1400" dirty="0" smtClean="0">
                           <a:solidFill>
                             <a:srgbClr val="FF0000"/>
                           </a:solidFill>
                         </a:rPr>
                         <a:t>対象外</a:t>
                       </a:r>
-                      <a:endParaRPr kumimoji="1" lang="ja-JP" altLang="en-US" sz="1600" dirty="0">
+                      <a:endParaRPr kumimoji="1" lang="ja-JP" altLang="en-US" sz="1400" dirty="0">
                         <a:solidFill>
                           <a:srgbClr val="FF0000"/>
                         </a:solidFill>
@@ -9945,7 +9940,7 @@
                     <a:lstStyle/>
                     <a:p>
                       <a:r>
-                        <a:rPr kumimoji="1" lang="ja-JP" altLang="en-US" sz="1200" dirty="0" smtClean="0">
+                        <a:rPr kumimoji="1" lang="ja-JP" altLang="en-US" sz="1400" dirty="0" smtClean="0">
                           <a:solidFill>
                             <a:srgbClr val="FF0000"/>
                           </a:solidFill>
@@ -10009,14 +10004,14 @@
                     <a:lstStyle/>
                     <a:p>
                       <a:r>
-                        <a:rPr kumimoji="1" lang="ja-JP" altLang="en-US" sz="1600" dirty="0" smtClean="0">
+                        <a:rPr kumimoji="1" lang="ja-JP" altLang="en-US" sz="1400" dirty="0" smtClean="0">
                           <a:solidFill>
                             <a:srgbClr val="FF0000"/>
                           </a:solidFill>
                         </a:rPr>
                         <a:t>収集エラー</a:t>
                       </a:r>
-                      <a:endParaRPr kumimoji="1" lang="ja-JP" altLang="en-US" sz="1600" dirty="0">
+                      <a:endParaRPr kumimoji="1" lang="ja-JP" altLang="en-US" sz="1400" dirty="0">
                         <a:solidFill>
                           <a:srgbClr val="FF0000"/>
                         </a:solidFill>
@@ -10071,14 +10066,14 @@
                     <a:lstStyle/>
                     <a:p>
                       <a:r>
-                        <a:rPr kumimoji="1" lang="ja-JP" altLang="en-US" sz="1200" dirty="0" smtClean="0">
+                        <a:rPr kumimoji="1" lang="ja-JP" altLang="en-US" sz="1400" dirty="0" smtClean="0">
                           <a:solidFill>
                             <a:srgbClr val="FF0000"/>
                           </a:solidFill>
                         </a:rPr>
                         <a:t>登録したオペレーションかターゲットホストの情報に不備があった場合</a:t>
                       </a:r>
-                      <a:endParaRPr kumimoji="1" lang="ja-JP" altLang="en-US" sz="1200" dirty="0">
+                      <a:endParaRPr kumimoji="1" lang="ja-JP" altLang="en-US" sz="1400" dirty="0">
                         <a:solidFill>
                           <a:srgbClr val="FF0000"/>
                         </a:solidFill>
@@ -39923,15 +39918,7 @@
                     <a:p>
                       <a:r>
                         <a:rPr kumimoji="1" lang="ja-JP" altLang="en-US" sz="1200" b="0" dirty="0" smtClean="0"/>
-                        <a:t>収集した</a:t>
-                      </a:r>
-                      <a:r>
-                        <a:rPr kumimoji="1" lang="ja-JP" altLang="en-US" sz="1200" b="0" dirty="0" smtClean="0"/>
-                        <a:t>値を登録するパラメータシート</a:t>
-                      </a:r>
-                      <a:r>
-                        <a:rPr kumimoji="1" lang="ja-JP" altLang="en-US" sz="1200" b="0" dirty="0" smtClean="0"/>
-                        <a:t>を作成します。</a:t>
+                        <a:t>収集した値を登録するパラメータシートを作成します。</a:t>
                       </a:r>
                       <a:endParaRPr kumimoji="1" lang="ja-JP" altLang="en-US" sz="1200" b="0" dirty="0" smtClean="0">
                         <a:solidFill>

</xml_diff>